<commit_message>
Cleans up the remaining Bacon
</commit_message>
<xml_diff>
--- a/Documentation/Presentation.pptx
+++ b/Documentation/Presentation.pptx
@@ -305,7 +305,7 @@
             <a:fld id="{372CC3DD-1061-444F-A922-60D720A708A4}" type="datetimeFigureOut">
               <a:rPr lang="en-US" altLang="en-US"/>
               <a:pPr/>
-              <a:t>1/10/2016</a:t>
+              <a:t>1/12/2016</a:t>
             </a:fld>
             <a:endParaRPr lang="en-US" altLang="en-US"/>
           </a:p>
@@ -506,7 +506,7 @@
             <a:fld id="{404CED31-2C6E-49CB-8939-5CB1C820A419}" type="datetimeFigureOut">
               <a:rPr lang="en-US" altLang="en-US"/>
               <a:pPr/>
-              <a:t>1/10/2016</a:t>
+              <a:t>1/12/2016</a:t>
             </a:fld>
             <a:endParaRPr lang="en-US" altLang="en-US"/>
           </a:p>
@@ -879,11 +879,7 @@
             </a:pPr>
             <a:r>
               <a:rPr lang="en-US" dirty="0" smtClean="0"/>
-              <a:t>Red Arrow</a:t>
-            </a:r>
-            <a:r>
-              <a:rPr lang="en-US" baseline="0" dirty="0" smtClean="0"/>
-              <a:t> is a Business to Business/ Business to Consumer Custom Software Shop</a:t>
+              <a:t>Grew up in Vermont</a:t>
             </a:r>
           </a:p>
           <a:p>
@@ -892,8 +888,12 @@
               <a:buChar char="•"/>
             </a:pPr>
             <a:r>
+              <a:rPr lang="en-US" dirty="0" smtClean="0"/>
+              <a:t>Traveled</a:t>
+            </a:r>
+            <a:r>
               <a:rPr lang="en-US" baseline="0" dirty="0" smtClean="0"/>
-              <a:t>History of the last 6 years</a:t>
+              <a:t> in a UWP</a:t>
             </a:r>
           </a:p>
           <a:p>
@@ -903,13 +903,8 @@
             </a:pPr>
             <a:r>
               <a:rPr lang="en-US" baseline="0" dirty="0" smtClean="0"/>
-              <a:t>Purchase by </a:t>
-            </a:r>
-            <a:r>
-              <a:rPr lang="en-US" baseline="0" dirty="0" err="1" smtClean="0"/>
-              <a:t>Dohmen</a:t>
-            </a:r>
-            <a:endParaRPr lang="en-US" baseline="0" dirty="0" smtClean="0"/>
+              <a:t>Landed in WI at Carroll University</a:t>
+            </a:r>
           </a:p>
           <a:p>
             <a:pPr marL="171450" indent="-171450">
@@ -917,11 +912,60 @@
               <a:buChar char="•"/>
             </a:pPr>
             <a:r>
+              <a:rPr lang="en-US" dirty="0" smtClean="0"/>
+              <a:t>Red </a:t>
+            </a:r>
+            <a:r>
+              <a:rPr lang="en-US" dirty="0" smtClean="0"/>
+              <a:t>Arrow</a:t>
+            </a:r>
+            <a:r>
               <a:rPr lang="en-US" baseline="0" dirty="0" smtClean="0"/>
-              <a:t>Where we go from here</a:t>
-            </a:r>
-          </a:p>
-          <a:p>
+              <a:t> is a Business to Business/ Business to Consumer Custom Software Shop</a:t>
+            </a:r>
+          </a:p>
+          <a:p>
+            <a:pPr marL="171450" indent="-171450">
+              <a:buFont typeface="Arial" panose="020B0604020202020204" pitchFamily="34" charset="0"/>
+              <a:buChar char="•"/>
+            </a:pPr>
+            <a:r>
+              <a:rPr lang="en-US" baseline="0" dirty="0" smtClean="0"/>
+              <a:t>History of the last 6 years</a:t>
+            </a:r>
+          </a:p>
+          <a:p>
+            <a:pPr marL="171450" indent="-171450">
+              <a:buFont typeface="Arial" panose="020B0604020202020204" pitchFamily="34" charset="0"/>
+              <a:buChar char="•"/>
+            </a:pPr>
+            <a:r>
+              <a:rPr lang="en-US" baseline="0" dirty="0" smtClean="0"/>
+              <a:t>Purchase by </a:t>
+            </a:r>
+            <a:r>
+              <a:rPr lang="en-US" baseline="0" dirty="0" err="1" smtClean="0"/>
+              <a:t>Dohmen</a:t>
+            </a:r>
+            <a:r>
+              <a:rPr lang="en-US" baseline="0" dirty="0" smtClean="0"/>
+              <a:t> January 2014</a:t>
+            </a:r>
+            <a:endParaRPr lang="en-US" baseline="0" dirty="0" smtClean="0"/>
+          </a:p>
+          <a:p>
+            <a:pPr marL="171450" indent="-171450">
+              <a:buFont typeface="Arial" panose="020B0604020202020204" pitchFamily="34" charset="0"/>
+              <a:buChar char="•"/>
+            </a:pPr>
+            <a:r>
+              <a:rPr lang="en-US" baseline="0" dirty="0" smtClean="0"/>
+              <a:t>Where we go from </a:t>
+            </a:r>
+            <a:r>
+              <a:rPr lang="en-US" baseline="0" dirty="0" smtClean="0"/>
+              <a:t>here, Creating an efficient, effective, and easy to use health experience.</a:t>
+            </a:r>
             <a:endParaRPr lang="en-US" baseline="0" dirty="0" smtClean="0"/>
           </a:p>
         </p:txBody>
@@ -2972,7 +3016,6 @@
               <a:rPr lang="en-US" baseline="0" dirty="0" smtClean="0"/>
               <a:t>?</a:t>
             </a:r>
-            <a:endParaRPr lang="en-US" baseline="0" dirty="0" smtClean="0"/>
           </a:p>
           <a:p>
             <a:r>
@@ -4207,7 +4250,7 @@
             <a:fld id="{72D0C6BF-7211-413F-BDDE-78E1AAEF1CB3}" type="datetimeFigureOut">
               <a:rPr lang="en-US" altLang="en-US"/>
               <a:pPr/>
-              <a:t>1/10/2016</a:t>
+              <a:t>1/12/2016</a:t>
             </a:fld>
             <a:endParaRPr lang="en-US" altLang="en-US"/>
           </a:p>
@@ -5755,7 +5798,7 @@
             <a:fld id="{D3BF8450-67C0-484D-BA70-4A28D9F71C17}" type="datetimeFigureOut">
               <a:rPr lang="en-US" altLang="en-US"/>
               <a:pPr/>
-              <a:t>1/10/2016</a:t>
+              <a:t>1/12/2016</a:t>
             </a:fld>
             <a:endParaRPr lang="en-US" altLang="en-US"/>
           </a:p>
@@ -6061,7 +6104,7 @@
             <a:fld id="{FE97CC21-BAAC-4376-8B83-2FFC681C4924}" type="datetimeFigureOut">
               <a:rPr lang="en-US" altLang="en-US"/>
               <a:pPr/>
-              <a:t>1/10/2016</a:t>
+              <a:t>1/12/2016</a:t>
             </a:fld>
             <a:endParaRPr lang="en-US" altLang="en-US"/>
           </a:p>
@@ -6292,7 +6335,7 @@
             <a:fld id="{A482C23B-8E04-428A-81C6-224925F61071}" type="datetimeFigureOut">
               <a:rPr lang="en-US" altLang="en-US"/>
               <a:pPr/>
-              <a:t>1/10/2016</a:t>
+              <a:t>1/12/2016</a:t>
             </a:fld>
             <a:endParaRPr lang="en-US" altLang="en-US"/>
           </a:p>
@@ -6854,7 +6897,7 @@
             <a:fld id="{1AE22F04-C588-4C61-A540-1A1218F6DA22}" type="datetimeFigureOut">
               <a:rPr lang="en-US" altLang="en-US"/>
               <a:pPr/>
-              <a:t>1/10/2016</a:t>
+              <a:t>1/12/2016</a:t>
             </a:fld>
             <a:endParaRPr lang="en-US" altLang="en-US"/>
           </a:p>
@@ -12315,7 +12358,7 @@
             </a:r>
             <a:r>
               <a:rPr lang="en-US" sz="2800" dirty="0" err="1" smtClean="0"/>
-              <a:t>Autofixture</a:t>
+              <a:t>AutoFixture</a:t>
             </a:r>
             <a:r>
               <a:rPr lang="en-US" sz="2800" dirty="0" smtClean="0"/>
@@ -12327,11 +12370,22 @@
             </a:r>
             <a:r>
               <a:rPr lang="en-US" sz="2800" dirty="0" smtClean="0"/>
-              <a:t> oh MY!</a:t>
+              <a:t> </a:t>
             </a:r>
             <a:r>
               <a:rPr lang="en-US" sz="2800" dirty="0" smtClean="0"/>
               <a:t/>
+            </a:r>
+            <a:br>
+              <a:rPr lang="en-US" sz="2800" dirty="0" smtClean="0"/>
+            </a:br>
+            <a:r>
+              <a:rPr lang="en-US" sz="2800" dirty="0" smtClean="0"/>
+              <a:t>Oh </a:t>
+            </a:r>
+            <a:r>
+              <a:rPr lang="en-US" sz="2800" dirty="0" smtClean="0"/>
+              <a:t>MY!</a:t>
             </a:r>
             <a:br>
               <a:rPr lang="en-US" sz="2800" dirty="0" smtClean="0"/>
@@ -17033,8 +17087,28 @@
           <a:lstStyle/>
           <a:p>
             <a:r>
-              <a:rPr lang="en-US" smtClean="0"/>
-              <a:t>Hiking Down the Approval Test Trail</a:t>
+              <a:rPr lang="en-US" dirty="0" smtClean="0"/>
+              <a:t>Approval </a:t>
+            </a:r>
+            <a:r>
+              <a:rPr lang="en-US" dirty="0" smtClean="0"/>
+              <a:t>Test </a:t>
+            </a:r>
+            <a:r>
+              <a:rPr lang="en-US" dirty="0" smtClean="0"/>
+              <a:t>/ </a:t>
+            </a:r>
+            <a:r>
+              <a:rPr lang="en-US" dirty="0" err="1" smtClean="0"/>
+              <a:t>AutoFixture</a:t>
+            </a:r>
+            <a:r>
+              <a:rPr lang="en-US" dirty="0" smtClean="0"/>
+              <a:t>/ </a:t>
+            </a:r>
+            <a:r>
+              <a:rPr lang="en-US" dirty="0" err="1" smtClean="0"/>
+              <a:t>AutoMoq</a:t>
             </a:r>
             <a:endParaRPr lang="en-US" dirty="0"/>
           </a:p>
@@ -17175,6 +17249,14 @@
             <a:r>
               <a:rPr lang="en-US" dirty="0" err="1" smtClean="0"/>
               <a:t>AutoFixture</a:t>
+            </a:r>
+            <a:r>
+              <a:rPr lang="en-US" dirty="0" smtClean="0"/>
+              <a:t>/</a:t>
+            </a:r>
+            <a:r>
+              <a:rPr lang="en-US" dirty="0" err="1" smtClean="0"/>
+              <a:t>AutoMoq</a:t>
             </a:r>
             <a:endParaRPr lang="en-US" dirty="0" smtClean="0"/>
           </a:p>

</xml_diff>